<commit_message>
chinh sua pp 1 chut xiu
</commit_message>
<xml_diff>
--- a/QuanLyPhongTro.pptx
+++ b/QuanLyPhongTro.pptx
@@ -66,7 +66,7 @@
       <p:bold r:id="rId40"/>
     </p:embeddedFont>
     <p:embeddedFont>
-      <p:font typeface="Roboto Condensed Light" panose="02000000000000000000" pitchFamily="2" charset="0"/>
+      <p:font typeface="Roboto Condensed Light" panose="020B0604020202020204" pitchFamily="2" charset="0"/>
       <p:regular r:id="rId41"/>
       <p:italic r:id="rId42"/>
     </p:embeddedFont>
@@ -10337,12 +10337,7 @@
             <a:off x="5060271" y="1464817"/>
             <a:ext cx="4010488" cy="1591321"/>
           </a:xfrm>
-          <a:solidFill>
-            <a:schemeClr val="tx2">
-              <a:lumMod val="50000"/>
-              <a:alpha val="90000"/>
-            </a:schemeClr>
-          </a:solidFill>
+          <a:noFill/>
         </p:spPr>
         <p:txBody>
           <a:bodyPr anchor="t">
@@ -10353,7 +10348,9 @@
             <a:r>
               <a:rPr lang="en-US" sz="2700" spc="225" dirty="0" err="1">
                 <a:solidFill>
-                  <a:schemeClr val="bg1"/>
+                  <a:schemeClr val="tx2">
+                    <a:lumMod val="50000"/>
+                  </a:schemeClr>
                 </a:solidFill>
                 <a:effectLst>
                   <a:outerShdw blurRad="38100" dist="38100" dir="2700000" algn="tl">
@@ -10371,7 +10368,9 @@
             <a:r>
               <a:rPr lang="en-US" sz="2700" spc="225" dirty="0">
                 <a:solidFill>
-                  <a:schemeClr val="bg1"/>
+                  <a:schemeClr val="tx2">
+                    <a:lumMod val="50000"/>
+                  </a:schemeClr>
                 </a:solidFill>
                 <a:effectLst>
                   <a:outerShdw blurRad="38100" dist="38100" dir="2700000" algn="tl">
@@ -10389,7 +10388,9 @@
             <a:r>
               <a:rPr lang="en-US" sz="2700" spc="225" dirty="0" err="1">
                 <a:solidFill>
-                  <a:schemeClr val="bg1"/>
+                  <a:schemeClr val="tx2">
+                    <a:lumMod val="50000"/>
+                  </a:schemeClr>
                 </a:solidFill>
                 <a:effectLst>
                   <a:outerShdw blurRad="38100" dist="38100" dir="2700000" algn="tl">
@@ -10407,7 +10408,9 @@
             <a:r>
               <a:rPr lang="en-US" sz="2700" spc="225" dirty="0">
                 <a:solidFill>
-                  <a:schemeClr val="bg1"/>
+                  <a:schemeClr val="tx2">
+                    <a:lumMod val="50000"/>
+                  </a:schemeClr>
                 </a:solidFill>
                 <a:effectLst>
                   <a:outerShdw blurRad="38100" dist="38100" dir="2700000" algn="tl">
@@ -10425,7 +10428,9 @@
             <a:r>
               <a:rPr lang="en-US" sz="2700" spc="225" dirty="0" err="1">
                 <a:solidFill>
-                  <a:schemeClr val="bg1"/>
+                  <a:schemeClr val="tx2">
+                    <a:lumMod val="50000"/>
+                  </a:schemeClr>
                 </a:solidFill>
                 <a:effectLst>
                   <a:outerShdw blurRad="38100" dist="38100" dir="2700000" algn="tl">
@@ -10443,7 +10448,9 @@
             <a:r>
               <a:rPr lang="en-US" sz="2700" spc="225" dirty="0">
                 <a:solidFill>
-                  <a:schemeClr val="bg1"/>
+                  <a:schemeClr val="tx2">
+                    <a:lumMod val="50000"/>
+                  </a:schemeClr>
                 </a:solidFill>
                 <a:effectLst>
                   <a:outerShdw blurRad="38100" dist="38100" dir="2700000" algn="tl">
@@ -10461,7 +10468,9 @@
             <a:r>
               <a:rPr lang="en-US" sz="2700" spc="225" dirty="0" err="1">
                 <a:solidFill>
-                  <a:schemeClr val="bg1"/>
+                  <a:schemeClr val="tx2">
+                    <a:lumMod val="50000"/>
+                  </a:schemeClr>
                 </a:solidFill>
                 <a:effectLst>
                   <a:outerShdw blurRad="38100" dist="38100" dir="2700000" algn="tl">
@@ -10479,7 +10488,9 @@
             <a:r>
               <a:rPr lang="en-US" sz="2700" spc="225" dirty="0">
                 <a:solidFill>
-                  <a:schemeClr val="bg1"/>
+                  <a:schemeClr val="tx2">
+                    <a:lumMod val="50000"/>
+                  </a:schemeClr>
                 </a:solidFill>
                 <a:effectLst>
                   <a:outerShdw blurRad="38100" dist="38100" dir="2700000" algn="tl">
@@ -10497,7 +10508,9 @@
             <a:r>
               <a:rPr lang="en-US" sz="2700" spc="225" dirty="0" err="1">
                 <a:solidFill>
-                  <a:schemeClr val="bg1"/>
+                  <a:schemeClr val="tx2">
+                    <a:lumMod val="50000"/>
+                  </a:schemeClr>
                 </a:solidFill>
                 <a:effectLst>
                   <a:outerShdw blurRad="38100" dist="38100" dir="2700000" algn="tl">
@@ -10515,7 +10528,9 @@
             <a:r>
               <a:rPr lang="en-US" sz="2700" spc="225" dirty="0">
                 <a:solidFill>
-                  <a:schemeClr val="bg1"/>
+                  <a:schemeClr val="tx2">
+                    <a:lumMod val="50000"/>
+                  </a:schemeClr>
                 </a:solidFill>
                 <a:effectLst>
                   <a:outerShdw blurRad="38100" dist="38100" dir="2700000" algn="tl">
@@ -10533,7 +10548,9 @@
             <a:r>
               <a:rPr lang="en-US" sz="2700" spc="225" dirty="0" err="1">
                 <a:solidFill>
-                  <a:schemeClr val="bg1"/>
+                  <a:schemeClr val="tx2">
+                    <a:lumMod val="50000"/>
+                  </a:schemeClr>
                 </a:solidFill>
                 <a:effectLst>
                   <a:outerShdw blurRad="38100" dist="38100" dir="2700000" algn="tl">
@@ -10551,7 +10568,9 @@
             <a:r>
               <a:rPr lang="en-US" sz="2700" spc="225" dirty="0">
                 <a:solidFill>
-                  <a:schemeClr val="bg1"/>
+                  <a:schemeClr val="tx2">
+                    <a:lumMod val="50000"/>
+                  </a:schemeClr>
                 </a:solidFill>
                 <a:effectLst>
                   <a:outerShdw blurRad="38100" dist="38100" dir="2700000" algn="tl">
@@ -10569,7 +10588,9 @@
             <a:r>
               <a:rPr lang="en-US" sz="2700" spc="225" dirty="0" err="1">
                 <a:solidFill>
-                  <a:schemeClr val="bg1"/>
+                  <a:schemeClr val="tx2">
+                    <a:lumMod val="50000"/>
+                  </a:schemeClr>
                 </a:solidFill>
                 <a:effectLst>
                   <a:outerShdw blurRad="38100" dist="38100" dir="2700000" algn="tl">
@@ -10587,7 +10608,9 @@
             <a:r>
               <a:rPr lang="en-US" sz="2700" spc="225" dirty="0">
                 <a:solidFill>
-                  <a:schemeClr val="bg1"/>
+                  <a:schemeClr val="tx2">
+                    <a:lumMod val="50000"/>
+                  </a:schemeClr>
                 </a:solidFill>
                 <a:effectLst>
                   <a:outerShdw blurRad="38100" dist="38100" dir="2700000" algn="tl">
@@ -10605,7 +10628,9 @@
             <a:r>
               <a:rPr lang="en-US" sz="2700" spc="225" dirty="0" err="1">
                 <a:solidFill>
-                  <a:schemeClr val="bg1"/>
+                  <a:schemeClr val="tx2">
+                    <a:lumMod val="50000"/>
+                  </a:schemeClr>
                 </a:solidFill>
                 <a:effectLst>
                   <a:outerShdw blurRad="38100" dist="38100" dir="2700000" algn="tl">
@@ -10623,7 +10648,9 @@
             <a:r>
               <a:rPr lang="en-US" sz="2700" spc="225" dirty="0">
                 <a:solidFill>
-                  <a:schemeClr val="bg1"/>
+                  <a:schemeClr val="tx2">
+                    <a:lumMod val="50000"/>
+                  </a:schemeClr>
                 </a:solidFill>
                 <a:effectLst>
                   <a:outerShdw blurRad="38100" dist="38100" dir="2700000" algn="tl">
@@ -10641,7 +10668,9 @@
             <a:r>
               <a:rPr lang="en-US" sz="2700" spc="225" dirty="0" err="1">
                 <a:solidFill>
-                  <a:schemeClr val="bg1"/>
+                  <a:schemeClr val="tx2">
+                    <a:lumMod val="50000"/>
+                  </a:schemeClr>
                 </a:solidFill>
                 <a:effectLst>
                   <a:outerShdw blurRad="38100" dist="38100" dir="2700000" algn="tl">
@@ -10659,7 +10688,9 @@
             <a:r>
               <a:rPr lang="en-US" sz="2700" spc="225" dirty="0">
                 <a:solidFill>
-                  <a:schemeClr val="bg1"/>
+                  <a:schemeClr val="tx2">
+                    <a:lumMod val="50000"/>
+                  </a:schemeClr>
                 </a:solidFill>
                 <a:effectLst>
                   <a:outerShdw blurRad="38100" dist="38100" dir="2700000" algn="tl">
@@ -10677,7 +10708,9 @@
             <a:r>
               <a:rPr lang="en-US" sz="2700" spc="225" dirty="0" err="1">
                 <a:solidFill>
-                  <a:schemeClr val="bg1"/>
+                  <a:schemeClr val="tx2">
+                    <a:lumMod val="50000"/>
+                  </a:schemeClr>
                 </a:solidFill>
                 <a:effectLst>
                   <a:outerShdw blurRad="38100" dist="38100" dir="2700000" algn="tl">
@@ -10695,7 +10728,9 @@
             <a:r>
               <a:rPr lang="en-US" sz="2700" spc="225" dirty="0">
                 <a:solidFill>
-                  <a:schemeClr val="bg1"/>
+                  <a:schemeClr val="tx2">
+                    <a:lumMod val="50000"/>
+                  </a:schemeClr>
                 </a:solidFill>
                 <a:effectLst>
                   <a:outerShdw blurRad="38100" dist="38100" dir="2700000" algn="tl">
@@ -10713,7 +10748,9 @@
             <a:br>
               <a:rPr lang="en-US" sz="1350" spc="225" dirty="0">
                 <a:solidFill>
-                  <a:schemeClr val="bg1"/>
+                  <a:schemeClr val="tx2">
+                    <a:lumMod val="50000"/>
+                  </a:schemeClr>
                 </a:solidFill>
                 <a:latin typeface="Calibri" panose="020F0502020204030204" pitchFamily="34" charset="0"/>
                 <a:ea typeface="Calibri" panose="020F0502020204030204" pitchFamily="34" charset="0"/>
@@ -10722,7 +10759,9 @@
             </a:br>
             <a:endParaRPr lang="en-US" sz="1500" spc="225" dirty="0">
               <a:solidFill>
-                <a:schemeClr val="bg1"/>
+                <a:schemeClr val="tx2">
+                  <a:lumMod val="50000"/>
+                </a:schemeClr>
               </a:solidFill>
             </a:endParaRPr>
           </a:p>
@@ -10867,7 +10906,7 @@
       </p:par>
     </p:tnLst>
     <p:bldLst>
-      <p:bldP spid="2" grpId="0" animBg="1"/>
+      <p:bldP spid="2" grpId="0"/>
     </p:bldLst>
   </p:timing>
 </p:sld>

</xml_diff>